<commit_message>
Changed details in USE CASE
just typos, and missplacements
</commit_message>
<xml_diff>
--- a/USE_CODE/layf.pptx
+++ b/USE_CODE/layf.pptx
@@ -201,7 +201,7 @@
           <a:p>
             <a:fld id="{3AD3A732-13D7-F54B-B6F6-B2B5915D5240}" type="datetimeFigureOut">
               <a:rPr lang="en-US" smtClean="0"/>
-              <a:t>3/17/22</a:t>
+              <a:t>3/18/22</a:t>
             </a:fld>
             <a:endParaRPr lang="en-US"/>
           </a:p>
@@ -783,7 +783,7 @@
           <a:p>
             <a:fld id="{60D63F8F-E2CD-364C-B682-C0AD5539214B}" type="datetimeFigureOut">
               <a:rPr lang="en-US" smtClean="0"/>
-              <a:t>3/17/22</a:t>
+              <a:t>3/18/22</a:t>
             </a:fld>
             <a:endParaRPr lang="en-US"/>
           </a:p>
@@ -981,7 +981,7 @@
           <a:p>
             <a:fld id="{60D63F8F-E2CD-364C-B682-C0AD5539214B}" type="datetimeFigureOut">
               <a:rPr lang="en-US" smtClean="0"/>
-              <a:t>3/17/22</a:t>
+              <a:t>3/18/22</a:t>
             </a:fld>
             <a:endParaRPr lang="en-US"/>
           </a:p>
@@ -1189,7 +1189,7 @@
           <a:p>
             <a:fld id="{60D63F8F-E2CD-364C-B682-C0AD5539214B}" type="datetimeFigureOut">
               <a:rPr lang="en-US" smtClean="0"/>
-              <a:t>3/17/22</a:t>
+              <a:t>3/18/22</a:t>
             </a:fld>
             <a:endParaRPr lang="en-US"/>
           </a:p>
@@ -1387,7 +1387,7 @@
           <a:p>
             <a:fld id="{60D63F8F-E2CD-364C-B682-C0AD5539214B}" type="datetimeFigureOut">
               <a:rPr lang="en-US" smtClean="0"/>
-              <a:t>3/17/22</a:t>
+              <a:t>3/18/22</a:t>
             </a:fld>
             <a:endParaRPr lang="en-US"/>
           </a:p>
@@ -1662,7 +1662,7 @@
           <a:p>
             <a:fld id="{60D63F8F-E2CD-364C-B682-C0AD5539214B}" type="datetimeFigureOut">
               <a:rPr lang="en-US" smtClean="0"/>
-              <a:t>3/17/22</a:t>
+              <a:t>3/18/22</a:t>
             </a:fld>
             <a:endParaRPr lang="en-US"/>
           </a:p>
@@ -1927,7 +1927,7 @@
           <a:p>
             <a:fld id="{60D63F8F-E2CD-364C-B682-C0AD5539214B}" type="datetimeFigureOut">
               <a:rPr lang="en-US" smtClean="0"/>
-              <a:t>3/17/22</a:t>
+              <a:t>3/18/22</a:t>
             </a:fld>
             <a:endParaRPr lang="en-US"/>
           </a:p>
@@ -2339,7 +2339,7 @@
           <a:p>
             <a:fld id="{60D63F8F-E2CD-364C-B682-C0AD5539214B}" type="datetimeFigureOut">
               <a:rPr lang="en-US" smtClean="0"/>
-              <a:t>3/17/22</a:t>
+              <a:t>3/18/22</a:t>
             </a:fld>
             <a:endParaRPr lang="en-US"/>
           </a:p>
@@ -2480,7 +2480,7 @@
           <a:p>
             <a:fld id="{60D63F8F-E2CD-364C-B682-C0AD5539214B}" type="datetimeFigureOut">
               <a:rPr lang="en-US" smtClean="0"/>
-              <a:t>3/17/22</a:t>
+              <a:t>3/18/22</a:t>
             </a:fld>
             <a:endParaRPr lang="en-US"/>
           </a:p>
@@ -2593,7 +2593,7 @@
           <a:p>
             <a:fld id="{60D63F8F-E2CD-364C-B682-C0AD5539214B}" type="datetimeFigureOut">
               <a:rPr lang="en-US" smtClean="0"/>
-              <a:t>3/17/22</a:t>
+              <a:t>3/18/22</a:t>
             </a:fld>
             <a:endParaRPr lang="en-US"/>
           </a:p>
@@ -2904,7 +2904,7 @@
           <a:p>
             <a:fld id="{60D63F8F-E2CD-364C-B682-C0AD5539214B}" type="datetimeFigureOut">
               <a:rPr lang="en-US" smtClean="0"/>
-              <a:t>3/17/22</a:t>
+              <a:t>3/18/22</a:t>
             </a:fld>
             <a:endParaRPr lang="en-US"/>
           </a:p>
@@ -3192,7 +3192,7 @@
           <a:p>
             <a:fld id="{60D63F8F-E2CD-364C-B682-C0AD5539214B}" type="datetimeFigureOut">
               <a:rPr lang="en-US" smtClean="0"/>
-              <a:t>3/17/22</a:t>
+              <a:t>3/18/22</a:t>
             </a:fld>
             <a:endParaRPr lang="en-US"/>
           </a:p>
@@ -3433,7 +3433,7 @@
           <a:p>
             <a:fld id="{60D63F8F-E2CD-364C-B682-C0AD5539214B}" type="datetimeFigureOut">
               <a:rPr lang="en-US" smtClean="0"/>
-              <a:t>3/17/22</a:t>
+              <a:t>3/18/22</a:t>
             </a:fld>
             <a:endParaRPr lang="en-US"/>
           </a:p>
@@ -8931,7 +8931,7 @@
             <a:pPr algn="ctr"/>
             <a:r>
               <a:rPr lang="en-US" sz="1000" dirty="0"/>
-              <a:t>Show Message Dialogue (Error)</a:t>
+              <a:t>Show Message Dialog (Error)</a:t>
             </a:r>
           </a:p>
         </p:txBody>
@@ -10846,7 +10846,7 @@
             <a:pPr algn="ctr"/>
             <a:r>
               <a:rPr lang="en-US" sz="1000" dirty="0"/>
-              <a:t>Show Message Dialogue (Error)</a:t>
+              <a:t>Show Message Dialog (Error)</a:t>
             </a:r>
           </a:p>
         </p:txBody>
@@ -11197,6 +11197,36 @@
           <a:chExt cx="0" cy="0"/>
         </a:xfrm>
       </p:grpSpPr>
+      <p:pic>
+        <p:nvPicPr>
+          <p:cNvPr id="3" name="Picture 2">
+            <a:extLst>
+              <a:ext uri="{FF2B5EF4-FFF2-40B4-BE49-F238E27FC236}">
+                <a16:creationId xmlns:a16="http://schemas.microsoft.com/office/drawing/2014/main" id="{0A087D98-F813-E44B-9572-3DA3459DE39C}"/>
+              </a:ext>
+            </a:extLst>
+          </p:cNvPr>
+          <p:cNvPicPr>
+            <a:picLocks noChangeAspect="1"/>
+          </p:cNvPicPr>
+          <p:nvPr/>
+        </p:nvPicPr>
+        <p:blipFill>
+          <a:blip r:embed="rId3"/>
+          <a:stretch>
+            <a:fillRect/>
+          </a:stretch>
+        </p:blipFill>
+        <p:spPr>
+          <a:xfrm>
+            <a:off x="-1" y="-1"/>
+            <a:ext cx="12192001" cy="6858001"/>
+          </a:xfrm>
+          <a:prstGeom prst="rect">
+            <a:avLst/>
+          </a:prstGeom>
+        </p:spPr>
+      </p:pic>
       <p:sp>
         <p:nvSpPr>
           <p:cNvPr id="15" name="Frame 14">
@@ -11273,7 +11303,7 @@
           <p:nvPr/>
         </p:nvPicPr>
         <p:blipFill>
-          <a:blip r:embed="rId3"/>
+          <a:blip r:embed="rId4"/>
           <a:stretch>
             <a:fillRect/>
           </a:stretch>
@@ -11338,7 +11368,7 @@
             <a:pPr algn="ctr"/>
             <a:r>
               <a:rPr lang="en-US" sz="1200" dirty="0"/>
-              <a:t>Input Music From Computer</a:t>
+              <a:t>Input Audio File From Computer</a:t>
             </a:r>
           </a:p>
         </p:txBody>
@@ -11358,7 +11388,7 @@
           <p:nvPr/>
         </p:nvPicPr>
         <p:blipFill>
-          <a:blip r:embed="rId4"/>
+          <a:blip r:embed="rId5"/>
           <a:stretch>
             <a:fillRect/>
           </a:stretch>
@@ -12882,30 +12912,29 @@
       </p:sp>
       <p:cxnSp>
         <p:nvCxnSpPr>
-          <p:cNvPr id="171" name="Straight Arrow Connector 170">
-            <a:extLst>
-              <a:ext uri="{FF2B5EF4-FFF2-40B4-BE49-F238E27FC236}">
-                <a16:creationId xmlns:a16="http://schemas.microsoft.com/office/drawing/2014/main" id="{5332F88E-78FF-A141-9F6C-88D9DE30C4AC}"/>
+          <p:cNvPr id="42" name="Straight Arrow Connector 41">
+            <a:extLst>
+              <a:ext uri="{FF2B5EF4-FFF2-40B4-BE49-F238E27FC236}">
+                <a16:creationId xmlns:a16="http://schemas.microsoft.com/office/drawing/2014/main" id="{88F95870-550E-ED47-B6B1-E9E92646ED15}"/>
               </a:ext>
             </a:extLst>
           </p:cNvPr>
           <p:cNvCxnSpPr>
             <a:cxnSpLocks/>
-            <a:stCxn id="139" idx="4"/>
-            <a:endCxn id="175" idx="0"/>
+            <a:stCxn id="139" idx="5"/>
+            <a:endCxn id="47" idx="1"/>
           </p:cNvCxnSpPr>
           <p:nvPr/>
         </p:nvCxnSpPr>
         <p:spPr>
-          <a:xfrm flipH="1">
-            <a:off x="2897289" y="5360629"/>
-            <a:ext cx="2" cy="487811"/>
+          <a:xfrm>
+            <a:off x="3262874" y="5284584"/>
+            <a:ext cx="729213" cy="595865"/>
           </a:xfrm>
           <a:prstGeom prst="straightConnector1">
             <a:avLst/>
           </a:prstGeom>
           <a:ln w="57150">
-            <a:prstDash val="sysDot"/>
             <a:headEnd type="none" w="med" len="med"/>
             <a:tailEnd type="triangle" w="med" len="med"/>
           </a:ln>
@@ -12927,10 +12956,10 @@
       </p:cxnSp>
       <p:sp>
         <p:nvSpPr>
-          <p:cNvPr id="175" name="Oval 174">
-            <a:extLst>
-              <a:ext uri="{FF2B5EF4-FFF2-40B4-BE49-F238E27FC236}">
-                <a16:creationId xmlns:a16="http://schemas.microsoft.com/office/drawing/2014/main" id="{C0885C9F-D5CE-414B-B986-E228AC0C26C4}"/>
+          <p:cNvPr id="47" name="Oval 46">
+            <a:extLst>
+              <a:ext uri="{FF2B5EF4-FFF2-40B4-BE49-F238E27FC236}">
+                <a16:creationId xmlns:a16="http://schemas.microsoft.com/office/drawing/2014/main" id="{26A40785-0CFB-4D48-BCC1-F65E72D0D4B5}"/>
               </a:ext>
             </a:extLst>
           </p:cNvPr>
@@ -12939,8 +12968,8 @@
         </p:nvSpPr>
         <p:spPr>
           <a:xfrm>
-            <a:off x="2227227" y="5848440"/>
-            <a:ext cx="1340124" cy="676373"/>
+            <a:off x="3785397" y="5774093"/>
+            <a:ext cx="1411367" cy="726245"/>
           </a:xfrm>
           <a:prstGeom prst="ellipse">
             <a:avLst/>
@@ -12974,18 +13003,18 @@
           <a:p>
             <a:pPr algn="ctr"/>
             <a:r>
-              <a:rPr lang="en-US" sz="1000" dirty="0"/>
-              <a:t>Show Message Dialogue (Error)</a:t>
-            </a:r>
-          </a:p>
-        </p:txBody>
-      </p:sp>
-      <p:sp>
-        <p:nvSpPr>
-          <p:cNvPr id="178" name="Rectangle 177">
-            <a:extLst>
-              <a:ext uri="{FF2B5EF4-FFF2-40B4-BE49-F238E27FC236}">
-                <a16:creationId xmlns:a16="http://schemas.microsoft.com/office/drawing/2014/main" id="{86835904-B107-0F43-8546-37D3C0138860}"/>
+              <a:rPr lang="en-US" sz="1100" dirty="0"/>
+              <a:t>Volume</a:t>
+            </a:r>
+          </a:p>
+        </p:txBody>
+      </p:sp>
+      <p:sp>
+        <p:nvSpPr>
+          <p:cNvPr id="48" name="Oval 47">
+            <a:extLst>
+              <a:ext uri="{FF2B5EF4-FFF2-40B4-BE49-F238E27FC236}">
+                <a16:creationId xmlns:a16="http://schemas.microsoft.com/office/drawing/2014/main" id="{91ED4140-AC83-D44B-AC87-0A360BD91DE7}"/>
               </a:ext>
             </a:extLst>
           </p:cNvPr>
@@ -12994,7 +13023,158 @@
         </p:nvSpPr>
         <p:spPr>
           <a:xfrm>
-            <a:off x="2488854" y="5412050"/>
+            <a:off x="5434033" y="5269378"/>
+            <a:ext cx="1411367" cy="726245"/>
+          </a:xfrm>
+          <a:prstGeom prst="ellipse">
+            <a:avLst/>
+          </a:prstGeom>
+          <a:solidFill>
+            <a:srgbClr val="16B999"/>
+          </a:solidFill>
+          <a:ln>
+            <a:noFill/>
+          </a:ln>
+        </p:spPr>
+        <p:style>
+          <a:lnRef idx="2">
+            <a:schemeClr val="accent1">
+              <a:shade val="50000"/>
+            </a:schemeClr>
+          </a:lnRef>
+          <a:fillRef idx="1">
+            <a:schemeClr val="accent1"/>
+          </a:fillRef>
+          <a:effectRef idx="0">
+            <a:schemeClr val="accent1"/>
+          </a:effectRef>
+          <a:fontRef idx="minor">
+            <a:schemeClr val="lt1"/>
+          </a:fontRef>
+        </p:style>
+        <p:txBody>
+          <a:bodyPr rtlCol="0" anchor="ctr"/>
+          <a:lstStyle/>
+          <a:p>
+            <a:pPr algn="ctr"/>
+            <a:r>
+              <a:rPr lang="en-US" sz="1200" dirty="0"/>
+              <a:t>Pop-up </a:t>
+            </a:r>
+            <a:r>
+              <a:rPr lang="en-US" sz="1200" dirty="0" err="1"/>
+              <a:t>JFrame</a:t>
+            </a:r>
+            <a:endParaRPr lang="en-US" sz="1200" dirty="0"/>
+          </a:p>
+        </p:txBody>
+      </p:sp>
+      <p:cxnSp>
+        <p:nvCxnSpPr>
+          <p:cNvPr id="49" name="Straight Arrow Connector 48">
+            <a:extLst>
+              <a:ext uri="{FF2B5EF4-FFF2-40B4-BE49-F238E27FC236}">
+                <a16:creationId xmlns:a16="http://schemas.microsoft.com/office/drawing/2014/main" id="{FDA1DA0B-98E7-6B4A-86C6-2C304E4BD8FD}"/>
+              </a:ext>
+            </a:extLst>
+          </p:cNvPr>
+          <p:cNvCxnSpPr>
+            <a:cxnSpLocks/>
+            <a:stCxn id="48" idx="2"/>
+            <a:endCxn id="47" idx="7"/>
+          </p:cNvCxnSpPr>
+          <p:nvPr/>
+        </p:nvCxnSpPr>
+        <p:spPr>
+          <a:xfrm flipH="1">
+            <a:off x="4990074" y="5632501"/>
+            <a:ext cx="443959" cy="247948"/>
+          </a:xfrm>
+          <a:prstGeom prst="straightConnector1">
+            <a:avLst/>
+          </a:prstGeom>
+          <a:ln w="57150">
+            <a:solidFill>
+              <a:schemeClr val="accent1"/>
+            </a:solidFill>
+            <a:prstDash val="sysDot"/>
+            <a:tailEnd type="triangle"/>
+          </a:ln>
+        </p:spPr>
+        <p:style>
+          <a:lnRef idx="1">
+            <a:schemeClr val="accent1"/>
+          </a:lnRef>
+          <a:fillRef idx="0">
+            <a:schemeClr val="accent1"/>
+          </a:fillRef>
+          <a:effectRef idx="0">
+            <a:schemeClr val="accent1"/>
+          </a:effectRef>
+          <a:fontRef idx="minor">
+            <a:schemeClr val="tx1"/>
+          </a:fontRef>
+        </p:style>
+      </p:cxnSp>
+      <p:cxnSp>
+        <p:nvCxnSpPr>
+          <p:cNvPr id="51" name="Straight Arrow Connector 50">
+            <a:extLst>
+              <a:ext uri="{FF2B5EF4-FFF2-40B4-BE49-F238E27FC236}">
+                <a16:creationId xmlns:a16="http://schemas.microsoft.com/office/drawing/2014/main" id="{808A466C-951E-6A4B-9824-5674CE6CBCB1}"/>
+              </a:ext>
+            </a:extLst>
+          </p:cNvPr>
+          <p:cNvCxnSpPr>
+            <a:cxnSpLocks/>
+            <a:stCxn id="140" idx="0"/>
+            <a:endCxn id="53" idx="4"/>
+          </p:cNvCxnSpPr>
+          <p:nvPr/>
+        </p:nvCxnSpPr>
+        <p:spPr>
+          <a:xfrm flipH="1" flipV="1">
+            <a:off x="2557020" y="2475282"/>
+            <a:ext cx="355733" cy="728907"/>
+          </a:xfrm>
+          <a:prstGeom prst="straightConnector1">
+            <a:avLst/>
+          </a:prstGeom>
+          <a:ln w="57150">
+            <a:prstDash val="sysDot"/>
+            <a:tailEnd type="triangle"/>
+          </a:ln>
+        </p:spPr>
+        <p:style>
+          <a:lnRef idx="1">
+            <a:schemeClr val="accent1"/>
+          </a:lnRef>
+          <a:fillRef idx="0">
+            <a:schemeClr val="accent1"/>
+          </a:fillRef>
+          <a:effectRef idx="0">
+            <a:schemeClr val="accent1"/>
+          </a:effectRef>
+          <a:fontRef idx="minor">
+            <a:schemeClr val="tx1"/>
+          </a:fontRef>
+        </p:style>
+      </p:cxnSp>
+      <p:sp>
+        <p:nvSpPr>
+          <p:cNvPr id="52" name="Rectangle 51">
+            <a:extLst>
+              <a:ext uri="{FF2B5EF4-FFF2-40B4-BE49-F238E27FC236}">
+                <a16:creationId xmlns:a16="http://schemas.microsoft.com/office/drawing/2014/main" id="{61373B81-624D-CD49-BCC1-C26E758694EC}"/>
+              </a:ext>
+            </a:extLst>
+          </p:cNvPr>
+          <p:cNvSpPr/>
+          <p:nvPr/>
+        </p:nvSpPr>
+        <p:spPr>
+          <a:xfrm>
+            <a:off x="2269090" y="2724689"/>
             <a:ext cx="816871" cy="270916"/>
           </a:xfrm>
           <a:prstGeom prst="rect">
@@ -13039,56 +13219,12 @@
           </a:p>
         </p:txBody>
       </p:sp>
-      <p:cxnSp>
-        <p:nvCxnSpPr>
-          <p:cNvPr id="42" name="Straight Arrow Connector 41">
-            <a:extLst>
-              <a:ext uri="{FF2B5EF4-FFF2-40B4-BE49-F238E27FC236}">
-                <a16:creationId xmlns:a16="http://schemas.microsoft.com/office/drawing/2014/main" id="{88F95870-550E-ED47-B6B1-E9E92646ED15}"/>
-              </a:ext>
-            </a:extLst>
-          </p:cNvPr>
-          <p:cNvCxnSpPr>
-            <a:cxnSpLocks/>
-            <a:stCxn id="139" idx="5"/>
-            <a:endCxn id="47" idx="1"/>
-          </p:cNvCxnSpPr>
-          <p:nvPr/>
-        </p:nvCxnSpPr>
-        <p:spPr>
-          <a:xfrm>
-            <a:off x="3262874" y="5284584"/>
-            <a:ext cx="729213" cy="595865"/>
-          </a:xfrm>
-          <a:prstGeom prst="straightConnector1">
-            <a:avLst/>
-          </a:prstGeom>
-          <a:ln w="57150">
-            <a:headEnd type="none" w="med" len="med"/>
-            <a:tailEnd type="triangle" w="med" len="med"/>
-          </a:ln>
-        </p:spPr>
-        <p:style>
-          <a:lnRef idx="1">
-            <a:schemeClr val="accent1"/>
-          </a:lnRef>
-          <a:fillRef idx="0">
-            <a:schemeClr val="accent1"/>
-          </a:fillRef>
-          <a:effectRef idx="0">
-            <a:schemeClr val="accent1"/>
-          </a:effectRef>
-          <a:fontRef idx="minor">
-            <a:schemeClr val="tx1"/>
-          </a:fontRef>
-        </p:style>
-      </p:cxnSp>
-      <p:sp>
-        <p:nvSpPr>
-          <p:cNvPr id="47" name="Oval 46">
-            <a:extLst>
-              <a:ext uri="{FF2B5EF4-FFF2-40B4-BE49-F238E27FC236}">
-                <a16:creationId xmlns:a16="http://schemas.microsoft.com/office/drawing/2014/main" id="{26A40785-0CFB-4D48-BCC1-F65E72D0D4B5}"/>
+      <p:sp>
+        <p:nvSpPr>
+          <p:cNvPr id="53" name="Oval 52">
+            <a:extLst>
+              <a:ext uri="{FF2B5EF4-FFF2-40B4-BE49-F238E27FC236}">
+                <a16:creationId xmlns:a16="http://schemas.microsoft.com/office/drawing/2014/main" id="{A8D9E74D-4011-B94A-99C5-D157C016AF27}"/>
               </a:ext>
             </a:extLst>
           </p:cNvPr>
@@ -13097,8 +13233,8 @@
         </p:nvSpPr>
         <p:spPr>
           <a:xfrm>
-            <a:off x="3785397" y="5774093"/>
-            <a:ext cx="1411367" cy="726245"/>
+            <a:off x="1761841" y="1749037"/>
+            <a:ext cx="1590358" cy="726245"/>
           </a:xfrm>
           <a:prstGeom prst="ellipse">
             <a:avLst/>
@@ -13133,17 +13269,17 @@
             <a:pPr algn="ctr"/>
             <a:r>
               <a:rPr lang="en-US" sz="1100" dirty="0"/>
-              <a:t>Volume</a:t>
-            </a:r>
-          </a:p>
-        </p:txBody>
-      </p:sp>
-      <p:sp>
-        <p:nvSpPr>
-          <p:cNvPr id="48" name="Oval 47">
-            <a:extLst>
-              <a:ext uri="{FF2B5EF4-FFF2-40B4-BE49-F238E27FC236}">
-                <a16:creationId xmlns:a16="http://schemas.microsoft.com/office/drawing/2014/main" id="{91ED4140-AC83-D44B-AC87-0A360BD91DE7}"/>
+              <a:t>Show Message Dialog (Error)</a:t>
+            </a:r>
+          </a:p>
+        </p:txBody>
+      </p:sp>
+      <p:sp>
+        <p:nvSpPr>
+          <p:cNvPr id="82" name="Oval 81">
+            <a:extLst>
+              <a:ext uri="{FF2B5EF4-FFF2-40B4-BE49-F238E27FC236}">
+                <a16:creationId xmlns:a16="http://schemas.microsoft.com/office/drawing/2014/main" id="{A8D681B1-3C05-114D-B9A1-4520F09F46DD}"/>
               </a:ext>
             </a:extLst>
           </p:cNvPr>
@@ -13152,7 +13288,7 @@
         </p:nvSpPr>
         <p:spPr>
           <a:xfrm>
-            <a:off x="5314157" y="5255983"/>
+            <a:off x="5886312" y="970639"/>
             <a:ext cx="1411367" cy="726245"/>
           </a:xfrm>
           <a:prstGeom prst="ellipse">
@@ -13188,44 +13324,36 @@
             <a:pPr algn="ctr"/>
             <a:r>
               <a:rPr lang="en-US" sz="1200" dirty="0"/>
-              <a:t>Pop-up </a:t>
-            </a:r>
-            <a:r>
-              <a:rPr lang="en-US" sz="1200" dirty="0" err="1"/>
-              <a:t>JFrame</a:t>
-            </a:r>
-            <a:endParaRPr lang="en-US" sz="1200" dirty="0"/>
+              <a:t>Check if file is wav or mp3</a:t>
+            </a:r>
           </a:p>
         </p:txBody>
       </p:sp>
       <p:cxnSp>
         <p:nvCxnSpPr>
-          <p:cNvPr id="49" name="Straight Arrow Connector 48">
-            <a:extLst>
-              <a:ext uri="{FF2B5EF4-FFF2-40B4-BE49-F238E27FC236}">
-                <a16:creationId xmlns:a16="http://schemas.microsoft.com/office/drawing/2014/main" id="{FDA1DA0B-98E7-6B4A-86C6-2C304E4BD8FD}"/>
+          <p:cNvPr id="84" name="Straight Arrow Connector 83">
+            <a:extLst>
+              <a:ext uri="{FF2B5EF4-FFF2-40B4-BE49-F238E27FC236}">
+                <a16:creationId xmlns:a16="http://schemas.microsoft.com/office/drawing/2014/main" id="{6F2E7379-9532-D74F-A487-8B7D21AD5186}"/>
               </a:ext>
             </a:extLst>
           </p:cNvPr>
           <p:cNvCxnSpPr>
             <a:cxnSpLocks/>
-            <a:stCxn id="47" idx="7"/>
-            <a:endCxn id="48" idx="2"/>
+            <a:stCxn id="21" idx="6"/>
+            <a:endCxn id="82" idx="2"/>
           </p:cNvCxnSpPr>
           <p:nvPr/>
         </p:nvCxnSpPr>
         <p:spPr>
-          <a:xfrm flipV="1">
-            <a:off x="4990074" y="5619106"/>
-            <a:ext cx="324083" cy="261343"/>
+          <a:xfrm>
+            <a:off x="5235804" y="1322429"/>
+            <a:ext cx="650508" cy="11333"/>
           </a:xfrm>
           <a:prstGeom prst="straightConnector1">
             <a:avLst/>
           </a:prstGeom>
           <a:ln w="57150">
-            <a:solidFill>
-              <a:schemeClr val="accent1"/>
-            </a:solidFill>
             <a:prstDash val="solid"/>
             <a:tailEnd type="triangle"/>
           </a:ln>
@@ -13245,56 +13373,12 @@
           </a:fontRef>
         </p:style>
       </p:cxnSp>
-      <p:cxnSp>
-        <p:nvCxnSpPr>
-          <p:cNvPr id="51" name="Straight Arrow Connector 50">
-            <a:extLst>
-              <a:ext uri="{FF2B5EF4-FFF2-40B4-BE49-F238E27FC236}">
-                <a16:creationId xmlns:a16="http://schemas.microsoft.com/office/drawing/2014/main" id="{808A466C-951E-6A4B-9824-5674CE6CBCB1}"/>
-              </a:ext>
-            </a:extLst>
-          </p:cNvPr>
-          <p:cNvCxnSpPr>
-            <a:cxnSpLocks/>
-            <a:stCxn id="140" idx="0"/>
-            <a:endCxn id="53" idx="4"/>
-          </p:cNvCxnSpPr>
-          <p:nvPr/>
-        </p:nvCxnSpPr>
-        <p:spPr>
-          <a:xfrm flipH="1" flipV="1">
-            <a:off x="2557020" y="2475282"/>
-            <a:ext cx="355733" cy="728907"/>
-          </a:xfrm>
-          <a:prstGeom prst="straightConnector1">
-            <a:avLst/>
-          </a:prstGeom>
-          <a:ln w="57150">
-            <a:prstDash val="sysDot"/>
-            <a:tailEnd type="triangle"/>
-          </a:ln>
-        </p:spPr>
-        <p:style>
-          <a:lnRef idx="1">
-            <a:schemeClr val="accent1"/>
-          </a:lnRef>
-          <a:fillRef idx="0">
-            <a:schemeClr val="accent1"/>
-          </a:fillRef>
-          <a:effectRef idx="0">
-            <a:schemeClr val="accent1"/>
-          </a:effectRef>
-          <a:fontRef idx="minor">
-            <a:schemeClr val="tx1"/>
-          </a:fontRef>
-        </p:style>
-      </p:cxnSp>
-      <p:sp>
-        <p:nvSpPr>
-          <p:cNvPr id="52" name="Rectangle 51">
-            <a:extLst>
-              <a:ext uri="{FF2B5EF4-FFF2-40B4-BE49-F238E27FC236}">
-                <a16:creationId xmlns:a16="http://schemas.microsoft.com/office/drawing/2014/main" id="{61373B81-624D-CD49-BCC1-C26E758694EC}"/>
+      <p:sp>
+        <p:nvSpPr>
+          <p:cNvPr id="94" name="Oval 93">
+            <a:extLst>
+              <a:ext uri="{FF2B5EF4-FFF2-40B4-BE49-F238E27FC236}">
+                <a16:creationId xmlns:a16="http://schemas.microsoft.com/office/drawing/2014/main" id="{612E2A5E-F948-D64A-A1AC-36F4B3AAB8E4}"/>
               </a:ext>
             </a:extLst>
           </p:cNvPr>
@@ -13303,67 +13387,8 @@
         </p:nvSpPr>
         <p:spPr>
           <a:xfrm>
-            <a:off x="2269090" y="2724689"/>
-            <a:ext cx="816871" cy="270916"/>
-          </a:xfrm>
-          <a:prstGeom prst="rect">
-            <a:avLst/>
-          </a:prstGeom>
-          <a:solidFill>
-            <a:schemeClr val="bg1"/>
-          </a:solidFill>
-          <a:ln>
-            <a:noFill/>
-          </a:ln>
-        </p:spPr>
-        <p:style>
-          <a:lnRef idx="2">
-            <a:schemeClr val="accent1">
-              <a:shade val="50000"/>
-            </a:schemeClr>
-          </a:lnRef>
-          <a:fillRef idx="1">
-            <a:schemeClr val="accent1"/>
-          </a:fillRef>
-          <a:effectRef idx="0">
-            <a:schemeClr val="accent1"/>
-          </a:effectRef>
-          <a:fontRef idx="minor">
-            <a:schemeClr val="lt1"/>
-          </a:fontRef>
-        </p:style>
-        <p:txBody>
-          <a:bodyPr rtlCol="0" anchor="ctr"/>
-          <a:lstStyle/>
-          <a:p>
-            <a:pPr lvl="0"/>
-            <a:r>
-              <a:rPr lang="en-US" sz="1000" dirty="0">
-                <a:solidFill>
-                  <a:prstClr val="black"/>
-                </a:solidFill>
-              </a:rPr>
-              <a:t>&lt;&lt;Include&gt;&gt;</a:t>
-            </a:r>
-          </a:p>
-        </p:txBody>
-      </p:sp>
-      <p:sp>
-        <p:nvSpPr>
-          <p:cNvPr id="53" name="Oval 52">
-            <a:extLst>
-              <a:ext uri="{FF2B5EF4-FFF2-40B4-BE49-F238E27FC236}">
-                <a16:creationId xmlns:a16="http://schemas.microsoft.com/office/drawing/2014/main" id="{A8D9E74D-4011-B94A-99C5-D157C016AF27}"/>
-              </a:ext>
-            </a:extLst>
-          </p:cNvPr>
-          <p:cNvSpPr/>
-          <p:nvPr/>
-        </p:nvSpPr>
-        <p:spPr>
-          <a:xfrm>
-            <a:off x="1761841" y="1749037"/>
-            <a:ext cx="1590358" cy="726245"/>
+            <a:off x="6995238" y="5748912"/>
+            <a:ext cx="1411367" cy="726245"/>
           </a:xfrm>
           <a:prstGeom prst="ellipse">
             <a:avLst/>
@@ -13397,160 +13422,6 @@
           <a:p>
             <a:pPr algn="ctr"/>
             <a:r>
-              <a:rPr lang="en-US" sz="1100" dirty="0"/>
-              <a:t>Show Message Dialogue (Error)</a:t>
-            </a:r>
-          </a:p>
-        </p:txBody>
-      </p:sp>
-      <p:sp>
-        <p:nvSpPr>
-          <p:cNvPr id="82" name="Oval 81">
-            <a:extLst>
-              <a:ext uri="{FF2B5EF4-FFF2-40B4-BE49-F238E27FC236}">
-                <a16:creationId xmlns:a16="http://schemas.microsoft.com/office/drawing/2014/main" id="{A8D681B1-3C05-114D-B9A1-4520F09F46DD}"/>
-              </a:ext>
-            </a:extLst>
-          </p:cNvPr>
-          <p:cNvSpPr/>
-          <p:nvPr/>
-        </p:nvSpPr>
-        <p:spPr>
-          <a:xfrm>
-            <a:off x="5886312" y="970639"/>
-            <a:ext cx="1411367" cy="726245"/>
-          </a:xfrm>
-          <a:prstGeom prst="ellipse">
-            <a:avLst/>
-          </a:prstGeom>
-          <a:solidFill>
-            <a:srgbClr val="16B999"/>
-          </a:solidFill>
-          <a:ln>
-            <a:noFill/>
-          </a:ln>
-        </p:spPr>
-        <p:style>
-          <a:lnRef idx="2">
-            <a:schemeClr val="accent1">
-              <a:shade val="50000"/>
-            </a:schemeClr>
-          </a:lnRef>
-          <a:fillRef idx="1">
-            <a:schemeClr val="accent1"/>
-          </a:fillRef>
-          <a:effectRef idx="0">
-            <a:schemeClr val="accent1"/>
-          </a:effectRef>
-          <a:fontRef idx="minor">
-            <a:schemeClr val="lt1"/>
-          </a:fontRef>
-        </p:style>
-        <p:txBody>
-          <a:bodyPr rtlCol="0" anchor="ctr"/>
-          <a:lstStyle/>
-          <a:p>
-            <a:pPr algn="ctr"/>
-            <a:r>
-              <a:rPr lang="en-US" sz="1200" dirty="0"/>
-              <a:t>Check if file is wav or mp3</a:t>
-            </a:r>
-          </a:p>
-        </p:txBody>
-      </p:sp>
-      <p:cxnSp>
-        <p:nvCxnSpPr>
-          <p:cNvPr id="84" name="Straight Arrow Connector 83">
-            <a:extLst>
-              <a:ext uri="{FF2B5EF4-FFF2-40B4-BE49-F238E27FC236}">
-                <a16:creationId xmlns:a16="http://schemas.microsoft.com/office/drawing/2014/main" id="{6F2E7379-9532-D74F-A487-8B7D21AD5186}"/>
-              </a:ext>
-            </a:extLst>
-          </p:cNvPr>
-          <p:cNvCxnSpPr>
-            <a:cxnSpLocks/>
-            <a:stCxn id="21" idx="6"/>
-            <a:endCxn id="82" idx="2"/>
-          </p:cNvCxnSpPr>
-          <p:nvPr/>
-        </p:nvCxnSpPr>
-        <p:spPr>
-          <a:xfrm>
-            <a:off x="5235804" y="1322429"/>
-            <a:ext cx="650508" cy="11333"/>
-          </a:xfrm>
-          <a:prstGeom prst="straightConnector1">
-            <a:avLst/>
-          </a:prstGeom>
-          <a:ln w="57150">
-            <a:prstDash val="solid"/>
-            <a:tailEnd type="triangle"/>
-          </a:ln>
-        </p:spPr>
-        <p:style>
-          <a:lnRef idx="1">
-            <a:schemeClr val="accent1"/>
-          </a:lnRef>
-          <a:fillRef idx="0">
-            <a:schemeClr val="accent1"/>
-          </a:fillRef>
-          <a:effectRef idx="0">
-            <a:schemeClr val="accent1"/>
-          </a:effectRef>
-          <a:fontRef idx="minor">
-            <a:schemeClr val="tx1"/>
-          </a:fontRef>
-        </p:style>
-      </p:cxnSp>
-      <p:sp>
-        <p:nvSpPr>
-          <p:cNvPr id="94" name="Oval 93">
-            <a:extLst>
-              <a:ext uri="{FF2B5EF4-FFF2-40B4-BE49-F238E27FC236}">
-                <a16:creationId xmlns:a16="http://schemas.microsoft.com/office/drawing/2014/main" id="{612E2A5E-F948-D64A-A1AC-36F4B3AAB8E4}"/>
-              </a:ext>
-            </a:extLst>
-          </p:cNvPr>
-          <p:cNvSpPr/>
-          <p:nvPr/>
-        </p:nvSpPr>
-        <p:spPr>
-          <a:xfrm>
-            <a:off x="6995238" y="5748912"/>
-            <a:ext cx="1411367" cy="726245"/>
-          </a:xfrm>
-          <a:prstGeom prst="ellipse">
-            <a:avLst/>
-          </a:prstGeom>
-          <a:solidFill>
-            <a:srgbClr val="16B999"/>
-          </a:solidFill>
-          <a:ln>
-            <a:noFill/>
-          </a:ln>
-        </p:spPr>
-        <p:style>
-          <a:lnRef idx="2">
-            <a:schemeClr val="accent1">
-              <a:shade val="50000"/>
-            </a:schemeClr>
-          </a:lnRef>
-          <a:fillRef idx="1">
-            <a:schemeClr val="accent1"/>
-          </a:fillRef>
-          <a:effectRef idx="0">
-            <a:schemeClr val="accent1"/>
-          </a:effectRef>
-          <a:fontRef idx="minor">
-            <a:schemeClr val="lt1"/>
-          </a:fontRef>
-        </p:style>
-        <p:txBody>
-          <a:bodyPr rtlCol="0" anchor="ctr"/>
-          <a:lstStyle/>
-          <a:p>
-            <a:pPr algn="ctr"/>
-            <a:r>
               <a:rPr lang="en-US" sz="1200" dirty="0"/>
               <a:t>Increase / Decrease Volume</a:t>
             </a:r>
@@ -13575,8 +13446,8 @@
         </p:nvCxnSpPr>
         <p:spPr>
           <a:xfrm>
-            <a:off x="6518834" y="5875872"/>
-            <a:ext cx="476404" cy="236163"/>
+            <a:off x="6638710" y="5889267"/>
+            <a:ext cx="356528" cy="222768"/>
           </a:xfrm>
           <a:prstGeom prst="straightConnector1">
             <a:avLst/>
@@ -14055,6 +13926,223 @@
           </a:fontRef>
         </p:style>
       </p:cxnSp>
+      <p:cxnSp>
+        <p:nvCxnSpPr>
+          <p:cNvPr id="60" name="Straight Arrow Connector 59">
+            <a:extLst>
+              <a:ext uri="{FF2B5EF4-FFF2-40B4-BE49-F238E27FC236}">
+                <a16:creationId xmlns:a16="http://schemas.microsoft.com/office/drawing/2014/main" id="{DF64DA27-48BA-684C-B241-97FF334BD7D5}"/>
+              </a:ext>
+            </a:extLst>
+          </p:cNvPr>
+          <p:cNvCxnSpPr>
+            <a:cxnSpLocks/>
+            <a:endCxn id="61" idx="0"/>
+          </p:cNvCxnSpPr>
+          <p:nvPr/>
+        </p:nvCxnSpPr>
+        <p:spPr>
+          <a:xfrm flipH="1">
+            <a:off x="3996653" y="1684686"/>
+            <a:ext cx="567611" cy="469407"/>
+          </a:xfrm>
+          <a:prstGeom prst="straightConnector1">
+            <a:avLst/>
+          </a:prstGeom>
+          <a:ln w="57150">
+            <a:prstDash val="sysDot"/>
+            <a:headEnd type="none" w="med" len="med"/>
+            <a:tailEnd type="triangle" w="med" len="med"/>
+          </a:ln>
+        </p:spPr>
+        <p:style>
+          <a:lnRef idx="1">
+            <a:schemeClr val="accent1"/>
+          </a:lnRef>
+          <a:fillRef idx="0">
+            <a:schemeClr val="accent1"/>
+          </a:fillRef>
+          <a:effectRef idx="0">
+            <a:schemeClr val="accent1"/>
+          </a:effectRef>
+          <a:fontRef idx="minor">
+            <a:schemeClr val="tx1"/>
+          </a:fontRef>
+        </p:style>
+      </p:cxnSp>
+      <p:sp>
+        <p:nvSpPr>
+          <p:cNvPr id="61" name="Oval 60">
+            <a:extLst>
+              <a:ext uri="{FF2B5EF4-FFF2-40B4-BE49-F238E27FC236}">
+                <a16:creationId xmlns:a16="http://schemas.microsoft.com/office/drawing/2014/main" id="{C2FF06B5-D9FA-734A-B0C8-523D0DA2BC9A}"/>
+              </a:ext>
+            </a:extLst>
+          </p:cNvPr>
+          <p:cNvSpPr/>
+          <p:nvPr/>
+        </p:nvSpPr>
+        <p:spPr>
+          <a:xfrm>
+            <a:off x="3326591" y="2154093"/>
+            <a:ext cx="1340124" cy="676373"/>
+          </a:xfrm>
+          <a:prstGeom prst="ellipse">
+            <a:avLst/>
+          </a:prstGeom>
+          <a:solidFill>
+            <a:srgbClr val="16B999"/>
+          </a:solidFill>
+          <a:ln>
+            <a:noFill/>
+          </a:ln>
+        </p:spPr>
+        <p:style>
+          <a:lnRef idx="2">
+            <a:schemeClr val="accent1">
+              <a:shade val="50000"/>
+            </a:schemeClr>
+          </a:lnRef>
+          <a:fillRef idx="1">
+            <a:schemeClr val="accent1"/>
+          </a:fillRef>
+          <a:effectRef idx="0">
+            <a:schemeClr val="accent1"/>
+          </a:effectRef>
+          <a:fontRef idx="minor">
+            <a:schemeClr val="lt1"/>
+          </a:fontRef>
+        </p:style>
+        <p:txBody>
+          <a:bodyPr rtlCol="0" anchor="ctr"/>
+          <a:lstStyle/>
+          <a:p>
+            <a:pPr algn="ctr"/>
+            <a:r>
+              <a:rPr lang="en-US" sz="1000" dirty="0"/>
+              <a:t>Show Message Dialog (Error)</a:t>
+            </a:r>
+          </a:p>
+        </p:txBody>
+      </p:sp>
+      <p:sp>
+        <p:nvSpPr>
+          <p:cNvPr id="62" name="Rectangle 61">
+            <a:extLst>
+              <a:ext uri="{FF2B5EF4-FFF2-40B4-BE49-F238E27FC236}">
+                <a16:creationId xmlns:a16="http://schemas.microsoft.com/office/drawing/2014/main" id="{E663A445-6F70-C140-B4BB-6FB8FA629321}"/>
+              </a:ext>
+            </a:extLst>
+          </p:cNvPr>
+          <p:cNvSpPr/>
+          <p:nvPr/>
+        </p:nvSpPr>
+        <p:spPr>
+          <a:xfrm>
+            <a:off x="3672678" y="1717359"/>
+            <a:ext cx="816871" cy="270916"/>
+          </a:xfrm>
+          <a:prstGeom prst="rect">
+            <a:avLst/>
+          </a:prstGeom>
+          <a:solidFill>
+            <a:schemeClr val="bg1"/>
+          </a:solidFill>
+          <a:ln>
+            <a:noFill/>
+          </a:ln>
+        </p:spPr>
+        <p:style>
+          <a:lnRef idx="2">
+            <a:schemeClr val="accent1">
+              <a:shade val="50000"/>
+            </a:schemeClr>
+          </a:lnRef>
+          <a:fillRef idx="1">
+            <a:schemeClr val="accent1"/>
+          </a:fillRef>
+          <a:effectRef idx="0">
+            <a:schemeClr val="accent1"/>
+          </a:effectRef>
+          <a:fontRef idx="minor">
+            <a:schemeClr val="lt1"/>
+          </a:fontRef>
+        </p:style>
+        <p:txBody>
+          <a:bodyPr rtlCol="0" anchor="ctr"/>
+          <a:lstStyle/>
+          <a:p>
+            <a:pPr lvl="0"/>
+            <a:r>
+              <a:rPr lang="en-US" sz="1000" dirty="0">
+                <a:solidFill>
+                  <a:prstClr val="black"/>
+                </a:solidFill>
+              </a:rPr>
+              <a:t>&lt;&lt;Include&gt;&gt;</a:t>
+            </a:r>
+          </a:p>
+        </p:txBody>
+      </p:sp>
+      <p:sp>
+        <p:nvSpPr>
+          <p:cNvPr id="64" name="Rectangle 63">
+            <a:extLst>
+              <a:ext uri="{FF2B5EF4-FFF2-40B4-BE49-F238E27FC236}">
+                <a16:creationId xmlns:a16="http://schemas.microsoft.com/office/drawing/2014/main" id="{41224AE7-74C5-6447-A8B9-D52E317C59CB}"/>
+              </a:ext>
+            </a:extLst>
+          </p:cNvPr>
+          <p:cNvSpPr/>
+          <p:nvPr/>
+        </p:nvSpPr>
+        <p:spPr>
+          <a:xfrm>
+            <a:off x="4485690" y="5458032"/>
+            <a:ext cx="816871" cy="270916"/>
+          </a:xfrm>
+          <a:prstGeom prst="rect">
+            <a:avLst/>
+          </a:prstGeom>
+          <a:solidFill>
+            <a:schemeClr val="bg1"/>
+          </a:solidFill>
+          <a:ln>
+            <a:noFill/>
+          </a:ln>
+        </p:spPr>
+        <p:style>
+          <a:lnRef idx="2">
+            <a:schemeClr val="accent1">
+              <a:shade val="50000"/>
+            </a:schemeClr>
+          </a:lnRef>
+          <a:fillRef idx="1">
+            <a:schemeClr val="accent1"/>
+          </a:fillRef>
+          <a:effectRef idx="0">
+            <a:schemeClr val="accent1"/>
+          </a:effectRef>
+          <a:fontRef idx="minor">
+            <a:schemeClr val="lt1"/>
+          </a:fontRef>
+        </p:style>
+        <p:txBody>
+          <a:bodyPr rtlCol="0" anchor="ctr"/>
+          <a:lstStyle/>
+          <a:p>
+            <a:pPr lvl="0"/>
+            <a:r>
+              <a:rPr lang="en-US" sz="1000" dirty="0">
+                <a:solidFill>
+                  <a:prstClr val="black"/>
+                </a:solidFill>
+              </a:rPr>
+              <a:t>&lt;&lt;Extend&gt;&gt;</a:t>
+            </a:r>
+          </a:p>
+        </p:txBody>
+      </p:sp>
     </p:spTree>
     <p:extLst>
       <p:ext uri="{BB962C8B-B14F-4D97-AF65-F5344CB8AC3E}">

</xml_diff>